<commit_message>
Mainītā dokumentācija ar prezentāciju, kā arī papildus testa datu pievienošana
</commit_message>
<xml_diff>
--- a/dokumentācija/Kvalifikācijas darba prezentācija___Gundars_Pelle_D4-3.pptx
+++ b/dokumentācija/Kvalifikācijas darba prezentācija___Gundars_Pelle_D4-3.pptx
@@ -7684,7 +7684,7 @@
           <a:p>
             <a:fld id="{D8D1B4B5-2019-4164-9A5E-7198BBE691F7}" type="datetimeFigureOut">
               <a:rPr lang="en-US" smtClean="0"/>
-              <a:t>6/15/2022</a:t>
+              <a:t>6/19/2022</a:t>
             </a:fld>
             <a:endParaRPr lang="en-US"/>
           </a:p>
@@ -8368,7 +8368,7 @@
           <a:p>
             <a:fld id="{236F5DEE-F27F-4A59-A018-A6DECE2C29E6}" type="datetimeFigureOut">
               <a:rPr lang="en-US" smtClean="0"/>
-              <a:t>6/15/2022</a:t>
+              <a:t>6/19/2022</a:t>
             </a:fld>
             <a:endParaRPr lang="en-US" dirty="0"/>
           </a:p>
@@ -8543,7 +8543,7 @@
           <a:p>
             <a:fld id="{236F5DEE-F27F-4A59-A018-A6DECE2C29E6}" type="datetimeFigureOut">
               <a:rPr lang="en-US" smtClean="0"/>
-              <a:t>6/15/2022</a:t>
+              <a:t>6/19/2022</a:t>
             </a:fld>
             <a:endParaRPr lang="en-US"/>
           </a:p>
@@ -8979,7 +8979,7 @@
           <a:p>
             <a:fld id="{236F5DEE-F27F-4A59-A018-A6DECE2C29E6}" type="datetimeFigureOut">
               <a:rPr lang="en-US" smtClean="0"/>
-              <a:t>6/15/2022</a:t>
+              <a:t>6/19/2022</a:t>
             </a:fld>
             <a:endParaRPr lang="en-US"/>
           </a:p>
@@ -9585,7 +9585,7 @@
                 </a:solidFill>
               </a:rPr>
               <a:pPr algn="ctr"/>
-              <a:t>2022</a:t>
+              <a:t>2022. g.</a:t>
             </a:fld>
             <a:endParaRPr lang="lv-LV" sz="2400">
               <a:solidFill>
@@ -9971,10 +9971,10 @@
       </p:sp>
       <p:pic>
         <p:nvPicPr>
-          <p:cNvPr id="5" name="Picture 4">
+          <p:cNvPr id="4" name="Picture 3">
             <a:extLst>
               <a:ext uri="{FF2B5EF4-FFF2-40B4-BE49-F238E27FC236}">
-                <a16:creationId xmlns:a16="http://schemas.microsoft.com/office/drawing/2014/main" id="{834F4B06-4F78-47A1-BD9C-A9FCA0D1486E}"/>
+                <a16:creationId xmlns:a16="http://schemas.microsoft.com/office/drawing/2014/main" id="{43C1A5E1-6E71-4154-978D-B25D97D5BAD2}"/>
               </a:ext>
             </a:extLst>
           </p:cNvPr>
@@ -9997,8 +9997,8 @@
         </p:blipFill>
         <p:spPr>
           <a:xfrm>
-            <a:off x="2005822" y="1090131"/>
-            <a:ext cx="8180356" cy="5607448"/>
+            <a:off x="1933994" y="1007701"/>
+            <a:ext cx="8324011" cy="5705920"/>
           </a:xfrm>
           <a:prstGeom prst="rect">
             <a:avLst/>
@@ -10179,10 +10179,10 @@
       </p:sp>
       <p:pic>
         <p:nvPicPr>
-          <p:cNvPr id="4" name="Picture 3">
+          <p:cNvPr id="5" name="Picture 4">
             <a:extLst>
               <a:ext uri="{FF2B5EF4-FFF2-40B4-BE49-F238E27FC236}">
-                <a16:creationId xmlns:a16="http://schemas.microsoft.com/office/drawing/2014/main" id="{2F3697D2-2E32-4A36-B98B-55CB6514FD5A}"/>
+                <a16:creationId xmlns:a16="http://schemas.microsoft.com/office/drawing/2014/main" id="{05E07B17-4A77-491B-935C-65B8AB6DD9A8}"/>
               </a:ext>
             </a:extLst>
           </p:cNvPr>
@@ -10205,8 +10205,8 @@
         </p:blipFill>
         <p:spPr>
           <a:xfrm>
-            <a:off x="273967" y="930442"/>
-            <a:ext cx="10807657" cy="7038474"/>
+            <a:off x="394285" y="1034716"/>
+            <a:ext cx="10672176" cy="6950242"/>
           </a:xfrm>
           <a:prstGeom prst="rect">
             <a:avLst/>
@@ -10282,10 +10282,10 @@
       </p:sp>
       <p:pic>
         <p:nvPicPr>
-          <p:cNvPr id="7" name="Picture 6">
+          <p:cNvPr id="9" name="Picture 8">
             <a:extLst>
               <a:ext uri="{FF2B5EF4-FFF2-40B4-BE49-F238E27FC236}">
-                <a16:creationId xmlns:a16="http://schemas.microsoft.com/office/drawing/2014/main" id="{7E1AD776-1A44-4928-BDC3-A89997C99ABE}"/>
+                <a16:creationId xmlns:a16="http://schemas.microsoft.com/office/drawing/2014/main" id="{6EBDF829-A901-4098-B6ED-F7824E1F3FF8}"/>
               </a:ext>
             </a:extLst>
           </p:cNvPr>
@@ -10302,8 +10302,8 @@
         </p:blipFill>
         <p:spPr>
           <a:xfrm>
-            <a:off x="540014" y="1491915"/>
-            <a:ext cx="9831207" cy="5157267"/>
+            <a:off x="498022" y="1333765"/>
+            <a:ext cx="10013767" cy="5238633"/>
           </a:xfrm>
           <a:prstGeom prst="rect">
             <a:avLst/>

</xml_diff>